<commit_message>
Add "get" in ArrayList.
</commit_message>
<xml_diff>
--- a/chapter13.pptx
+++ b/chapter13.pptx
@@ -1724,7 +1724,7 @@
           </a:bodyPr>
           <a:p>
             <a:pPr algn="r"/>
-            <a:fld id="{350BE8BA-E506-4ACE-9213-9CDD7D23EF7E}" type="slidenum">
+            <a:fld id="{52983E95-298E-48AC-9D44-DF562E6B975E}" type="slidenum">
               <a:rPr b="0" lang="en-US" sz="1400" spc="-1" strike="noStrike">
                 <a:latin typeface="Times New Roman"/>
               </a:rPr>
@@ -14752,7 +14752,7 @@
         </p:nvGraphicFramePr>
         <p:xfrm>
           <a:off x="1043280" y="1497960"/>
-          <a:ext cx="7100280" cy="2158560"/>
+          <a:ext cx="7100280" cy="2891880"/>
         </p:xfrm>
         <a:graphic>
           <a:graphicData uri="http://schemas.openxmlformats.org/drawingml/2006/table">
@@ -14762,7 +14762,119 @@
                 <a:gridCol w="2995560"/>
                 <a:gridCol w="4105080"/>
               </a:tblGrid>
-              <a:tr h="719640">
+              <a:tr h="510840">
+                <a:tc>
+                  <a:txBody>
+                    <a:bodyPr lIns="90000" rIns="90000" tIns="46800" bIns="46800" anchor="ctr">
+                      <a:noAutofit/>
+                    </a:bodyPr>
+                    <a:p>
+                      <a:r>
+                        <a:rPr b="0" lang="en-US" sz="1800" spc="-1" strike="noStrike">
+                          <a:latin typeface="Courier New"/>
+                        </a:rPr>
+                        <a:t>get(</a:t>
+                      </a:r>
+                      <a:r>
+                        <a:rPr b="0" i="1" lang="en-US" sz="1800" spc="-1" strike="noStrike">
+                          <a:latin typeface="Courier New"/>
+                        </a:rPr>
+                        <a:t>index</a:t>
+                      </a:r>
+                      <a:r>
+                        <a:rPr b="0" lang="en-US" sz="1800" spc="-1" strike="noStrike">
+                          <a:latin typeface="Courier New"/>
+                        </a:rPr>
+                        <a:t>)</a:t>
+                      </a:r>
+                      <a:endParaRPr b="0" lang="en-US" sz="1800" spc="-1" strike="noStrike">
+                        <a:latin typeface="Arial"/>
+                      </a:endParaRPr>
+                    </a:p>
+                  </a:txBody>
+                  <a:tcPr marL="90000" marR="90000">
+                    <a:lnL w="720">
+                      <a:solidFill>
+                        <a:srgbClr val="000000"/>
+                      </a:solidFill>
+                    </a:lnL>
+                    <a:lnR w="720">
+                      <a:solidFill>
+                        <a:srgbClr val="000000"/>
+                      </a:solidFill>
+                    </a:lnR>
+                    <a:lnT w="720">
+                      <a:solidFill>
+                        <a:srgbClr val="000000"/>
+                      </a:solidFill>
+                    </a:lnT>
+                    <a:lnB w="720">
+                      <a:solidFill>
+                        <a:srgbClr val="000000"/>
+                      </a:solidFill>
+                    </a:lnB>
+                    <a:solidFill>
+                      <a:srgbClr val="ffffff"/>
+                    </a:solidFill>
+                  </a:tcPr>
+                </a:tc>
+                <a:tc>
+                  <a:txBody>
+                    <a:bodyPr lIns="90000" rIns="90000" tIns="46800" bIns="46800" anchor="ctr">
+                      <a:noAutofit/>
+                    </a:bodyPr>
+                    <a:p>
+                      <a:r>
+                        <a:rPr b="0" lang="en-US" sz="1800" spc="-1" strike="noStrike">
+                          <a:latin typeface="Arial"/>
+                        </a:rPr>
+                        <a:t>Returns the object at position </a:t>
+                      </a:r>
+                      <a:r>
+                        <a:rPr b="0" i="1" lang="en-US" sz="1800" spc="-1" strike="noStrike">
+                          <a:latin typeface="Arial"/>
+                        </a:rPr>
+                        <a:t>index</a:t>
+                      </a:r>
+                      <a:r>
+                        <a:rPr b="0" lang="en-US" sz="1800" spc="-1" strike="noStrike">
+                          <a:latin typeface="Arial"/>
+                        </a:rPr>
+                        <a:t>.</a:t>
+                      </a:r>
+                      <a:endParaRPr b="0" lang="en-US" sz="1800" spc="-1" strike="noStrike">
+                        <a:latin typeface="Arial"/>
+                      </a:endParaRPr>
+                    </a:p>
+                  </a:txBody>
+                  <a:tcPr marL="90000" marR="90000">
+                    <a:lnL w="720">
+                      <a:solidFill>
+                        <a:srgbClr val="000000"/>
+                      </a:solidFill>
+                    </a:lnL>
+                    <a:lnR w="720">
+                      <a:solidFill>
+                        <a:srgbClr val="000000"/>
+                      </a:solidFill>
+                    </a:lnR>
+                    <a:lnT w="720">
+                      <a:solidFill>
+                        <a:srgbClr val="000000"/>
+                      </a:solidFill>
+                    </a:lnT>
+                    <a:lnB w="720">
+                      <a:solidFill>
+                        <a:srgbClr val="000000"/>
+                      </a:solidFill>
+                    </a:lnB>
+                    <a:solidFill>
+                      <a:srgbClr val="ffffff"/>
+                    </a:solidFill>
+                  </a:tcPr>
+                </a:tc>
+              </a:tr>
+              <a:tr h="640800">
                 <a:tc>
                   <a:txBody>
                     <a:bodyPr lIns="90000" rIns="90000" tIns="46800" bIns="46800" anchor="ctr">
@@ -14800,7 +14912,7 @@
                         <a:t>)</a:t>
                       </a:r>
                       <a:endParaRPr b="0" lang="en-US" sz="1800" spc="-1" strike="noStrike">
-                        <a:latin typeface="Arial"/>
+                        <a:latin typeface="Courier New"/>
                       </a:endParaRPr>
                     </a:p>
                   </a:txBody>
@@ -14898,7 +15010,7 @@
                   </a:tcPr>
                 </a:tc>
               </a:tr>
-              <a:tr h="719640">
+              <a:tr h="822600">
                 <a:tc>
                   <a:txBody>
                     <a:bodyPr lIns="90000" rIns="90000" tIns="46800" bIns="46800" anchor="ctr">
@@ -14998,7 +15110,7 @@
                   </a:tcPr>
                 </a:tc>
               </a:tr>
-              <a:tr h="719640">
+              <a:tr h="918000">
                 <a:tc>
                   <a:txBody>
                     <a:bodyPr lIns="90000" rIns="90000" tIns="46800" bIns="46800" anchor="ctr">

</xml_diff>